<commit_message>
Atualização no powerpoint e refresh depois de atualizar dados da empresa
</commit_message>
<xml_diff>
--- a/relatórios/Apresentação_final_Administration_West.pptx
+++ b/relatórios/Apresentação_final_Administration_West.pptx
@@ -13,9 +13,9 @@
     <p:sldId id="258" r:id="rId4"/>
     <p:sldId id="279" r:id="rId5"/>
     <p:sldId id="260" r:id="rId6"/>
-    <p:sldId id="273" r:id="rId7"/>
-    <p:sldId id="280" r:id="rId8"/>
-    <p:sldId id="278" r:id="rId9"/>
+    <p:sldId id="280" r:id="rId7"/>
+    <p:sldId id="278" r:id="rId8"/>
+    <p:sldId id="273" r:id="rId9"/>
     <p:sldId id="276" r:id="rId10"/>
     <p:sldId id="277" r:id="rId11"/>
     <p:sldId id="267" r:id="rId12"/>
@@ -208,7 +208,7 @@
           <a:p>
             <a:fld id="{67E8C7D5-63EE-478A-8448-DB0CFA12A5B8}" type="datetimeFigureOut">
               <a:rPr lang="en-US"/>
-              <a:t>2/21/2021</a:t>
+              <a:t>2/22/2021</a:t>
             </a:fld>
             <a:endParaRPr lang="en-US"/>
           </a:p>
@@ -725,12 +725,372 @@
           <a:bodyPr/>
           <a:lstStyle/>
           <a:p>
+            <a:pPr marL="285750" indent="-285750" algn="just">
+              <a:lnSpc>
+                <a:spcPct val="90000"/>
+              </a:lnSpc>
+              <a:spcBef>
+                <a:spcPts val="1000"/>
+              </a:spcBef>
+              <a:buFont typeface="Arial,Sans-Serif"/>
+              <a:buChar char="•"/>
+            </a:pPr>
+            <a:r>
+              <a:rPr lang="pt-PT">
+                <a:cs typeface="Calibri"/>
+              </a:rPr>
+              <a:t>Requisitos funcionais</a:t>
+            </a:r>
+          </a:p>
+          <a:p>
+            <a:pPr lvl="1" indent="-285750" algn="just">
+              <a:lnSpc>
+                <a:spcPct val="90000"/>
+              </a:lnSpc>
+              <a:spcBef>
+                <a:spcPts val="1000"/>
+              </a:spcBef>
+              <a:buFont typeface="Courier New"/>
+              <a:buChar char="o"/>
+            </a:pPr>
+            <a:r>
+              <a:rPr lang="pt-PT">
+                <a:cs typeface="Calibri"/>
+              </a:rPr>
+              <a:t>Registar a empresa através do </a:t>
+            </a:r>
+            <a:r>
+              <a:rPr lang="pt-PT" err="1">
+                <a:cs typeface="Calibri"/>
+              </a:rPr>
+              <a:t>backoffice</a:t>
+            </a:r>
+            <a:endParaRPr lang="pt-PT">
+              <a:cs typeface="Calibri"/>
+            </a:endParaRPr>
+          </a:p>
+          <a:p>
+            <a:pPr lvl="1" indent="-285750" algn="just">
+              <a:lnSpc>
+                <a:spcPct val="90000"/>
+              </a:lnSpc>
+              <a:spcBef>
+                <a:spcPts val="1000"/>
+              </a:spcBef>
+              <a:buFont typeface="Courier New"/>
+              <a:buChar char="o"/>
+            </a:pPr>
+            <a:r>
+              <a:rPr lang="pt-PT">
+                <a:cs typeface="Calibri"/>
+              </a:rPr>
+              <a:t>Empresa adicionar os produtos na plataforma</a:t>
+            </a:r>
+          </a:p>
+          <a:p>
+            <a:pPr lvl="1" indent="-285750" algn="just">
+              <a:lnSpc>
+                <a:spcPct val="90000"/>
+              </a:lnSpc>
+              <a:spcBef>
+                <a:spcPts val="1000"/>
+              </a:spcBef>
+              <a:buFont typeface="Courier New"/>
+              <a:buChar char="o"/>
+            </a:pPr>
+            <a:r>
+              <a:rPr lang="pt-PT">
+                <a:cs typeface="Calibri"/>
+              </a:rPr>
+              <a:t>O cliente faz registo e login na plataforma ( não precisa de estar </a:t>
+            </a:r>
+            <a:r>
+              <a:rPr lang="pt-PT" err="1">
+                <a:cs typeface="Calibri"/>
+              </a:rPr>
+              <a:t>logado</a:t>
+            </a:r>
+            <a:r>
+              <a:rPr lang="pt-PT">
+                <a:cs typeface="Calibri"/>
+              </a:rPr>
+              <a:t> para ver os produtos que vende)</a:t>
+            </a:r>
+          </a:p>
+          <a:p>
+            <a:pPr lvl="1" indent="-285750" algn="just">
+              <a:lnSpc>
+                <a:spcPct val="90000"/>
+              </a:lnSpc>
+              <a:spcBef>
+                <a:spcPts val="1000"/>
+              </a:spcBef>
+              <a:buFont typeface="Courier New"/>
+              <a:buChar char="o"/>
+            </a:pPr>
+            <a:r>
+              <a:rPr lang="pt-PT">
+                <a:cs typeface="Calibri"/>
+              </a:rPr>
+              <a:t>O cliente coloca os produtos no carrinho</a:t>
+            </a:r>
+          </a:p>
+          <a:p>
+            <a:pPr lvl="1" indent="-285750" algn="just">
+              <a:lnSpc>
+                <a:spcPct val="90000"/>
+              </a:lnSpc>
+              <a:spcBef>
+                <a:spcPts val="1000"/>
+              </a:spcBef>
+              <a:buFont typeface="Courier New"/>
+              <a:buChar char="o"/>
+            </a:pPr>
+            <a:r>
+              <a:rPr lang="pt-PT">
+                <a:cs typeface="Calibri"/>
+              </a:rPr>
+              <a:t>O cliente para os produtos</a:t>
+            </a:r>
+          </a:p>
+          <a:p>
+            <a:pPr marL="285750" indent="-285750" algn="just">
+              <a:lnSpc>
+                <a:spcPct val="90000"/>
+              </a:lnSpc>
+              <a:spcBef>
+                <a:spcPts val="1000"/>
+              </a:spcBef>
+              <a:buFont typeface="Arial,Sans-Serif"/>
+              <a:buChar char="•"/>
+            </a:pPr>
+            <a:endParaRPr lang="en-US">
+              <a:cs typeface="Calibri"/>
+            </a:endParaRPr>
+          </a:p>
+          <a:p>
+            <a:pPr marL="285750" indent="-285750" algn="just">
+              <a:lnSpc>
+                <a:spcPct val="90000"/>
+              </a:lnSpc>
+              <a:spcBef>
+                <a:spcPts val="1000"/>
+              </a:spcBef>
+              <a:buFont typeface="Arial,Sans-Serif"/>
+              <a:buChar char="•"/>
+            </a:pPr>
+            <a:r>
+              <a:rPr lang="en-US" err="1">
+                <a:cs typeface="Calibri"/>
+              </a:rPr>
+              <a:t>Requisitos</a:t>
+            </a:r>
+            <a:r>
+              <a:rPr lang="en-US">
+                <a:cs typeface="Calibri"/>
+              </a:rPr>
+              <a:t> </a:t>
+            </a:r>
+            <a:r>
+              <a:rPr lang="en-US" err="1">
+                <a:cs typeface="Calibri"/>
+              </a:rPr>
+              <a:t>não</a:t>
+            </a:r>
+            <a:r>
+              <a:rPr lang="en-US">
+                <a:cs typeface="Calibri"/>
+              </a:rPr>
+              <a:t> </a:t>
+            </a:r>
+            <a:r>
+              <a:rPr lang="en-US" err="1">
+                <a:cs typeface="Calibri"/>
+              </a:rPr>
+              <a:t>funcionais</a:t>
+            </a:r>
+            <a:endParaRPr lang="pt-PT">
+              <a:cs typeface="Calibri"/>
+            </a:endParaRPr>
+          </a:p>
+          <a:p>
+            <a:pPr marL="342900" lvl="1" indent="-171450">
+              <a:buFont typeface="Courier New"/>
+              <a:buChar char="o"/>
+            </a:pPr>
+            <a:r>
+              <a:rPr lang="en-US" err="1"/>
+              <a:t>Segurança</a:t>
+            </a:r>
             <a:r>
               <a:rPr lang="en-US"/>
-              <a:t>As tabelas que existem na base de dados são user, roles, permissions, permission_assignment, categories, companies, products, user_cart, billing_address, shipping_address, sales_group, sales_product, payment_methods, payment_reference e contact_form.</a:t>
-            </a:r>
-          </a:p>
-          <a:p>
+              <a:t> dos dados do </a:t>
+            </a:r>
+            <a:r>
+              <a:rPr lang="en-US" err="1"/>
+              <a:t>utilizador</a:t>
+            </a:r>
+            <a:r>
+              <a:rPr lang="en-US"/>
+              <a:t>; </a:t>
+            </a:r>
+            <a:endParaRPr lang="en-US">
+              <a:cs typeface="Calibri"/>
+            </a:endParaRPr>
+          </a:p>
+          <a:p>
+            <a:pPr marL="342900" lvl="1" indent="-171450">
+              <a:buFont typeface="Courier New"/>
+              <a:buChar char="o"/>
+            </a:pPr>
+            <a:r>
+              <a:rPr lang="en-US"/>
+              <a:t>Usabilidade da </a:t>
+            </a:r>
+            <a:r>
+              <a:rPr lang="en-US" err="1"/>
+              <a:t>aplicação</a:t>
+            </a:r>
+            <a:r>
+              <a:rPr lang="en-US"/>
+              <a:t> e </a:t>
+            </a:r>
+            <a:r>
+              <a:rPr lang="en-US" err="1"/>
+              <a:t>facilidade</a:t>
+            </a:r>
+            <a:r>
+              <a:rPr lang="en-US"/>
+              <a:t> de </a:t>
+            </a:r>
+            <a:r>
+              <a:rPr lang="en-US" err="1"/>
+              <a:t>uso</a:t>
+            </a:r>
+            <a:r>
+              <a:rPr lang="en-US"/>
+              <a:t>; </a:t>
+            </a:r>
+            <a:endParaRPr lang="en-US">
+              <a:cs typeface="Calibri"/>
+            </a:endParaRPr>
+          </a:p>
+          <a:p>
+            <a:pPr marL="342900" lvl="1" indent="-171450">
+              <a:buFont typeface="Courier New"/>
+              <a:buChar char="o"/>
+            </a:pPr>
+            <a:r>
+              <a:rPr lang="en-US" err="1"/>
+              <a:t>Desempenho</a:t>
+            </a:r>
+            <a:r>
+              <a:rPr lang="en-US"/>
+              <a:t> de </a:t>
+            </a:r>
+            <a:r>
+              <a:rPr lang="en-US" err="1"/>
+              <a:t>acesso</a:t>
+            </a:r>
+            <a:r>
+              <a:rPr lang="en-US"/>
+              <a:t> </a:t>
+            </a:r>
+            <a:r>
+              <a:rPr lang="en-US" err="1"/>
+              <a:t>aos</a:t>
+            </a:r>
+            <a:r>
+              <a:rPr lang="en-US"/>
+              <a:t> </a:t>
+            </a:r>
+            <a:r>
+              <a:rPr lang="en-US" err="1"/>
+              <a:t>elementos</a:t>
+            </a:r>
+            <a:r>
+              <a:rPr lang="en-US"/>
+              <a:t> web e da </a:t>
+            </a:r>
+            <a:r>
+              <a:rPr lang="en-US" err="1"/>
+              <a:t>aplicação</a:t>
+            </a:r>
+            <a:r>
+              <a:rPr lang="en-US"/>
+              <a:t> </a:t>
+            </a:r>
+            <a:r>
+              <a:rPr lang="en-US" err="1"/>
+              <a:t>móvel</a:t>
+            </a:r>
+            <a:r>
+              <a:rPr lang="en-US"/>
+              <a:t>; </a:t>
+            </a:r>
+            <a:endParaRPr lang="en-US">
+              <a:cs typeface="Calibri"/>
+            </a:endParaRPr>
+          </a:p>
+          <a:p>
+            <a:pPr marL="342900" lvl="1" indent="-171450">
+              <a:buFont typeface="Courier New"/>
+              <a:buChar char="o"/>
+            </a:pPr>
+            <a:r>
+              <a:rPr lang="en-US" err="1"/>
+              <a:t>Capacidade</a:t>
+            </a:r>
+            <a:r>
+              <a:rPr lang="en-US"/>
+              <a:t> de </a:t>
+            </a:r>
+            <a:r>
+              <a:rPr lang="en-US" err="1"/>
+              <a:t>implementar</a:t>
+            </a:r>
+            <a:r>
+              <a:rPr lang="en-US"/>
+              <a:t> </a:t>
+            </a:r>
+            <a:r>
+              <a:rPr lang="en-US" err="1"/>
+              <a:t>novas</a:t>
+            </a:r>
+            <a:r>
+              <a:rPr lang="en-US"/>
+              <a:t> </a:t>
+            </a:r>
+            <a:r>
+              <a:rPr lang="en-US" err="1"/>
+              <a:t>funções</a:t>
+            </a:r>
+            <a:r>
+              <a:rPr lang="en-US"/>
+              <a:t> no </a:t>
+            </a:r>
+            <a:r>
+              <a:rPr lang="en-US" err="1"/>
+              <a:t>futuro</a:t>
+            </a:r>
+            <a:r>
+              <a:rPr lang="en-US"/>
+              <a:t>.</a:t>
+            </a:r>
+            <a:endParaRPr lang="en-US">
+              <a:cs typeface="Calibri"/>
+            </a:endParaRPr>
+          </a:p>
+          <a:p>
+            <a:endParaRPr lang="en-US">
+              <a:cs typeface="Calibri"/>
+            </a:endParaRPr>
+          </a:p>
+          <a:p>
+            <a:pPr marL="342900" lvl="1" indent="-171450">
+              <a:buFont typeface="Courier New"/>
+              <a:buChar char="o"/>
+            </a:pPr>
             <a:endParaRPr lang="en-US">
               <a:cs typeface="Calibri"/>
             </a:endParaRPr>
@@ -763,7 +1123,7 @@
     </p:spTree>
     <p:extLst>
       <p:ext uri="{BB962C8B-B14F-4D97-AF65-F5344CB8AC3E}">
-        <p14:creationId xmlns:p14="http://schemas.microsoft.com/office/powerpoint/2010/main" val="754708541"/>
+        <p14:creationId xmlns:p14="http://schemas.microsoft.com/office/powerpoint/2010/main" val="1969940119"/>
       </p:ext>
     </p:extLst>
   </p:cSld>
@@ -1215,7 +1575,7 @@
     </p:spTree>
     <p:extLst>
       <p:ext uri="{BB962C8B-B14F-4D97-AF65-F5344CB8AC3E}">
-        <p14:creationId xmlns:p14="http://schemas.microsoft.com/office/powerpoint/2010/main" val="1969940119"/>
+        <p14:creationId xmlns:p14="http://schemas.microsoft.com/office/powerpoint/2010/main" val="3789757400"/>
       </p:ext>
     </p:extLst>
   </p:cSld>
@@ -1269,372 +1629,12 @@
           <a:bodyPr/>
           <a:lstStyle/>
           <a:p>
-            <a:pPr marL="285750" indent="-285750" algn="just">
-              <a:lnSpc>
-                <a:spcPct val="90000"/>
-              </a:lnSpc>
-              <a:spcBef>
-                <a:spcPts val="1000"/>
-              </a:spcBef>
-              <a:buFont typeface="Arial,Sans-Serif"/>
-              <a:buChar char="•"/>
-            </a:pPr>
-            <a:r>
-              <a:rPr lang="pt-PT">
-                <a:cs typeface="Calibri"/>
-              </a:rPr>
-              <a:t>Requisitos funcionais</a:t>
-            </a:r>
-          </a:p>
-          <a:p>
-            <a:pPr lvl="1" indent="-285750" algn="just">
-              <a:lnSpc>
-                <a:spcPct val="90000"/>
-              </a:lnSpc>
-              <a:spcBef>
-                <a:spcPts val="1000"/>
-              </a:spcBef>
-              <a:buFont typeface="Courier New"/>
-              <a:buChar char="o"/>
-            </a:pPr>
-            <a:r>
-              <a:rPr lang="pt-PT">
-                <a:cs typeface="Calibri"/>
-              </a:rPr>
-              <a:t>Registar a empresa através do </a:t>
-            </a:r>
-            <a:r>
-              <a:rPr lang="pt-PT" err="1">
-                <a:cs typeface="Calibri"/>
-              </a:rPr>
-              <a:t>backoffice</a:t>
-            </a:r>
-            <a:endParaRPr lang="pt-PT">
-              <a:cs typeface="Calibri"/>
-            </a:endParaRPr>
-          </a:p>
-          <a:p>
-            <a:pPr lvl="1" indent="-285750" algn="just">
-              <a:lnSpc>
-                <a:spcPct val="90000"/>
-              </a:lnSpc>
-              <a:spcBef>
-                <a:spcPts val="1000"/>
-              </a:spcBef>
-              <a:buFont typeface="Courier New"/>
-              <a:buChar char="o"/>
-            </a:pPr>
-            <a:r>
-              <a:rPr lang="pt-PT">
-                <a:cs typeface="Calibri"/>
-              </a:rPr>
-              <a:t>Empresa adicionar os produtos na plataforma</a:t>
-            </a:r>
-          </a:p>
-          <a:p>
-            <a:pPr lvl="1" indent="-285750" algn="just">
-              <a:lnSpc>
-                <a:spcPct val="90000"/>
-              </a:lnSpc>
-              <a:spcBef>
-                <a:spcPts val="1000"/>
-              </a:spcBef>
-              <a:buFont typeface="Courier New"/>
-              <a:buChar char="o"/>
-            </a:pPr>
-            <a:r>
-              <a:rPr lang="pt-PT">
-                <a:cs typeface="Calibri"/>
-              </a:rPr>
-              <a:t>O cliente faz registo e login na plataforma ( não precisa de estar </a:t>
-            </a:r>
-            <a:r>
-              <a:rPr lang="pt-PT" err="1">
-                <a:cs typeface="Calibri"/>
-              </a:rPr>
-              <a:t>logado</a:t>
-            </a:r>
-            <a:r>
-              <a:rPr lang="pt-PT">
-                <a:cs typeface="Calibri"/>
-              </a:rPr>
-              <a:t> para ver os produtos que vende)</a:t>
-            </a:r>
-          </a:p>
-          <a:p>
-            <a:pPr lvl="1" indent="-285750" algn="just">
-              <a:lnSpc>
-                <a:spcPct val="90000"/>
-              </a:lnSpc>
-              <a:spcBef>
-                <a:spcPts val="1000"/>
-              </a:spcBef>
-              <a:buFont typeface="Courier New"/>
-              <a:buChar char="o"/>
-            </a:pPr>
-            <a:r>
-              <a:rPr lang="pt-PT">
-                <a:cs typeface="Calibri"/>
-              </a:rPr>
-              <a:t>O cliente coloca os produtos no carrinho</a:t>
-            </a:r>
-          </a:p>
-          <a:p>
-            <a:pPr lvl="1" indent="-285750" algn="just">
-              <a:lnSpc>
-                <a:spcPct val="90000"/>
-              </a:lnSpc>
-              <a:spcBef>
-                <a:spcPts val="1000"/>
-              </a:spcBef>
-              <a:buFont typeface="Courier New"/>
-              <a:buChar char="o"/>
-            </a:pPr>
-            <a:r>
-              <a:rPr lang="pt-PT">
-                <a:cs typeface="Calibri"/>
-              </a:rPr>
-              <a:t>O cliente para os produtos</a:t>
-            </a:r>
-          </a:p>
-          <a:p>
-            <a:pPr marL="285750" indent="-285750" algn="just">
-              <a:lnSpc>
-                <a:spcPct val="90000"/>
-              </a:lnSpc>
-              <a:spcBef>
-                <a:spcPts val="1000"/>
-              </a:spcBef>
-              <a:buFont typeface="Arial,Sans-Serif"/>
-              <a:buChar char="•"/>
-            </a:pPr>
-            <a:endParaRPr lang="en-US">
-              <a:cs typeface="Calibri"/>
-            </a:endParaRPr>
-          </a:p>
-          <a:p>
-            <a:pPr marL="285750" indent="-285750" algn="just">
-              <a:lnSpc>
-                <a:spcPct val="90000"/>
-              </a:lnSpc>
-              <a:spcBef>
-                <a:spcPts val="1000"/>
-              </a:spcBef>
-              <a:buFont typeface="Arial,Sans-Serif"/>
-              <a:buChar char="•"/>
-            </a:pPr>
-            <a:r>
-              <a:rPr lang="en-US" err="1">
-                <a:cs typeface="Calibri"/>
-              </a:rPr>
-              <a:t>Requisitos</a:t>
-            </a:r>
-            <a:r>
-              <a:rPr lang="en-US">
-                <a:cs typeface="Calibri"/>
-              </a:rPr>
-              <a:t> </a:t>
-            </a:r>
-            <a:r>
-              <a:rPr lang="en-US" err="1">
-                <a:cs typeface="Calibri"/>
-              </a:rPr>
-              <a:t>não</a:t>
-            </a:r>
-            <a:r>
-              <a:rPr lang="en-US">
-                <a:cs typeface="Calibri"/>
-              </a:rPr>
-              <a:t> </a:t>
-            </a:r>
-            <a:r>
-              <a:rPr lang="en-US" err="1">
-                <a:cs typeface="Calibri"/>
-              </a:rPr>
-              <a:t>funcionais</a:t>
-            </a:r>
-            <a:endParaRPr lang="pt-PT">
-              <a:cs typeface="Calibri"/>
-            </a:endParaRPr>
-          </a:p>
-          <a:p>
-            <a:pPr marL="342900" lvl="1" indent="-171450">
-              <a:buFont typeface="Courier New"/>
-              <a:buChar char="o"/>
-            </a:pPr>
-            <a:r>
-              <a:rPr lang="en-US" err="1"/>
-              <a:t>Segurança</a:t>
-            </a:r>
             <a:r>
               <a:rPr lang="en-US"/>
-              <a:t> dos dados do </a:t>
-            </a:r>
-            <a:r>
-              <a:rPr lang="en-US" err="1"/>
-              <a:t>utilizador</a:t>
-            </a:r>
-            <a:r>
-              <a:rPr lang="en-US"/>
-              <a:t>; </a:t>
-            </a:r>
-            <a:endParaRPr lang="en-US">
-              <a:cs typeface="Calibri"/>
-            </a:endParaRPr>
-          </a:p>
-          <a:p>
-            <a:pPr marL="342900" lvl="1" indent="-171450">
-              <a:buFont typeface="Courier New"/>
-              <a:buChar char="o"/>
-            </a:pPr>
-            <a:r>
-              <a:rPr lang="en-US"/>
-              <a:t>Usabilidade da </a:t>
-            </a:r>
-            <a:r>
-              <a:rPr lang="en-US" err="1"/>
-              <a:t>aplicação</a:t>
-            </a:r>
-            <a:r>
-              <a:rPr lang="en-US"/>
-              <a:t> e </a:t>
-            </a:r>
-            <a:r>
-              <a:rPr lang="en-US" err="1"/>
-              <a:t>facilidade</a:t>
-            </a:r>
-            <a:r>
-              <a:rPr lang="en-US"/>
-              <a:t> de </a:t>
-            </a:r>
-            <a:r>
-              <a:rPr lang="en-US" err="1"/>
-              <a:t>uso</a:t>
-            </a:r>
-            <a:r>
-              <a:rPr lang="en-US"/>
-              <a:t>; </a:t>
-            </a:r>
-            <a:endParaRPr lang="en-US">
-              <a:cs typeface="Calibri"/>
-            </a:endParaRPr>
-          </a:p>
-          <a:p>
-            <a:pPr marL="342900" lvl="1" indent="-171450">
-              <a:buFont typeface="Courier New"/>
-              <a:buChar char="o"/>
-            </a:pPr>
-            <a:r>
-              <a:rPr lang="en-US" err="1"/>
-              <a:t>Desempenho</a:t>
-            </a:r>
-            <a:r>
-              <a:rPr lang="en-US"/>
-              <a:t> de </a:t>
-            </a:r>
-            <a:r>
-              <a:rPr lang="en-US" err="1"/>
-              <a:t>acesso</a:t>
-            </a:r>
-            <a:r>
-              <a:rPr lang="en-US"/>
-              <a:t> </a:t>
-            </a:r>
-            <a:r>
-              <a:rPr lang="en-US" err="1"/>
-              <a:t>aos</a:t>
-            </a:r>
-            <a:r>
-              <a:rPr lang="en-US"/>
-              <a:t> </a:t>
-            </a:r>
-            <a:r>
-              <a:rPr lang="en-US" err="1"/>
-              <a:t>elementos</a:t>
-            </a:r>
-            <a:r>
-              <a:rPr lang="en-US"/>
-              <a:t> web e da </a:t>
-            </a:r>
-            <a:r>
-              <a:rPr lang="en-US" err="1"/>
-              <a:t>aplicação</a:t>
-            </a:r>
-            <a:r>
-              <a:rPr lang="en-US"/>
-              <a:t> </a:t>
-            </a:r>
-            <a:r>
-              <a:rPr lang="en-US" err="1"/>
-              <a:t>móvel</a:t>
-            </a:r>
-            <a:r>
-              <a:rPr lang="en-US"/>
-              <a:t>; </a:t>
-            </a:r>
-            <a:endParaRPr lang="en-US">
-              <a:cs typeface="Calibri"/>
-            </a:endParaRPr>
-          </a:p>
-          <a:p>
-            <a:pPr marL="342900" lvl="1" indent="-171450">
-              <a:buFont typeface="Courier New"/>
-              <a:buChar char="o"/>
-            </a:pPr>
-            <a:r>
-              <a:rPr lang="en-US" err="1"/>
-              <a:t>Capacidade</a:t>
-            </a:r>
-            <a:r>
-              <a:rPr lang="en-US"/>
-              <a:t> de </a:t>
-            </a:r>
-            <a:r>
-              <a:rPr lang="en-US" err="1"/>
-              <a:t>implementar</a:t>
-            </a:r>
-            <a:r>
-              <a:rPr lang="en-US"/>
-              <a:t> </a:t>
-            </a:r>
-            <a:r>
-              <a:rPr lang="en-US" err="1"/>
-              <a:t>novas</a:t>
-            </a:r>
-            <a:r>
-              <a:rPr lang="en-US"/>
-              <a:t> </a:t>
-            </a:r>
-            <a:r>
-              <a:rPr lang="en-US" err="1"/>
-              <a:t>funções</a:t>
-            </a:r>
-            <a:r>
-              <a:rPr lang="en-US"/>
-              <a:t> no </a:t>
-            </a:r>
-            <a:r>
-              <a:rPr lang="en-US" err="1"/>
-              <a:t>futuro</a:t>
-            </a:r>
-            <a:r>
-              <a:rPr lang="en-US"/>
-              <a:t>.</a:t>
-            </a:r>
-            <a:endParaRPr lang="en-US">
-              <a:cs typeface="Calibri"/>
-            </a:endParaRPr>
-          </a:p>
-          <a:p>
-            <a:endParaRPr lang="en-US">
-              <a:cs typeface="Calibri"/>
-            </a:endParaRPr>
-          </a:p>
-          <a:p>
-            <a:pPr marL="342900" lvl="1" indent="-171450">
-              <a:buFont typeface="Courier New"/>
-              <a:buChar char="o"/>
-            </a:pPr>
+              <a:t>As tabelas que existem na base de dados são user, roles, permissions, permission_assignment, categories, companies, products, user_cart, billing_address, shipping_address, sales_group, sales_product, payment_methods, payment_reference e contact_form.</a:t>
+            </a:r>
+          </a:p>
+          <a:p>
             <a:endParaRPr lang="en-US">
               <a:cs typeface="Calibri"/>
             </a:endParaRPr>
@@ -1667,7 +1667,7 @@
     </p:spTree>
     <p:extLst>
       <p:ext uri="{BB962C8B-B14F-4D97-AF65-F5344CB8AC3E}">
-        <p14:creationId xmlns:p14="http://schemas.microsoft.com/office/powerpoint/2010/main" val="3789757400"/>
+        <p14:creationId xmlns:p14="http://schemas.microsoft.com/office/powerpoint/2010/main" val="754708541"/>
       </p:ext>
     </p:extLst>
   </p:cSld>
@@ -2447,7 +2447,7 @@
           <a:effectLst/>
           <a:extLst>
             <a:ext uri="{91240B29-F687-4f45-9708-019B960494DF}">
-              <a14:hiddenLine xmlns:a14="http://schemas.microsoft.com/office/drawing/2010/main" xmlns="" w="9525">
+              <a14:hiddenLine xmlns="" xmlns:a14="http://schemas.microsoft.com/office/drawing/2010/main" w="9525">
                 <a:solidFill>
                   <a:srgbClr val="000000"/>
                 </a:solidFill>
@@ -2639,7 +2639,7 @@
           <a:p>
             <a:fld id="{846CE7D5-CF57-46EF-B807-FDD0502418D4}" type="datetimeFigureOut">
               <a:rPr lang="en-US" smtClean="0"/>
-              <a:t>2/21/2021</a:t>
+              <a:t>2/22/2021</a:t>
             </a:fld>
             <a:endParaRPr lang="en-US"/>
           </a:p>
@@ -2958,7 +2958,7 @@
           <a:p>
             <a:fld id="{846CE7D5-CF57-46EF-B807-FDD0502418D4}" type="datetimeFigureOut">
               <a:rPr lang="en-US" smtClean="0"/>
-              <a:t>2/21/2021</a:t>
+              <a:t>2/22/2021</a:t>
             </a:fld>
             <a:endParaRPr lang="en-US"/>
           </a:p>
@@ -3447,7 +3447,7 @@
           <a:p>
             <a:fld id="{846CE7D5-CF57-46EF-B807-FDD0502418D4}" type="datetimeFigureOut">
               <a:rPr lang="en-US" smtClean="0"/>
-              <a:t>2/21/2021</a:t>
+              <a:t>2/22/2021</a:t>
             </a:fld>
             <a:endParaRPr lang="en-US"/>
           </a:p>
@@ -3817,7 +3817,7 @@
           <a:p>
             <a:fld id="{846CE7D5-CF57-46EF-B807-FDD0502418D4}" type="datetimeFigureOut">
               <a:rPr lang="en-US" smtClean="0"/>
-              <a:t>2/21/2021</a:t>
+              <a:t>2/22/2021</a:t>
             </a:fld>
             <a:endParaRPr lang="en-US"/>
           </a:p>
@@ -3973,7 +3973,7 @@
           <a:ln/>
           <a:extLst>
             <a:ext uri="{91240B29-F687-4f45-9708-019B960494DF}">
-              <a14:hiddenLine xmlns:a14="http://schemas.microsoft.com/office/drawing/2010/main" xmlns="" w="9525">
+              <a14:hiddenLine xmlns="" xmlns:a14="http://schemas.microsoft.com/office/drawing/2010/main" w="9525">
                 <a:solidFill>
                   <a:srgbClr val="000000"/>
                 </a:solidFill>
@@ -4091,7 +4091,7 @@
           <a:p>
             <a:fld id="{846CE7D5-CF57-46EF-B807-FDD0502418D4}" type="datetimeFigureOut">
               <a:rPr lang="en-US" smtClean="0"/>
-              <a:t>2/21/2021</a:t>
+              <a:t>2/22/2021</a:t>
             </a:fld>
             <a:endParaRPr lang="en-US"/>
           </a:p>
@@ -4249,7 +4249,7 @@
           <a:ln/>
           <a:extLst>
             <a:ext uri="{91240B29-F687-4f45-9708-019B960494DF}">
-              <a14:hiddenLine xmlns:a14="http://schemas.microsoft.com/office/drawing/2010/main" xmlns="" w="9525">
+              <a14:hiddenLine xmlns="" xmlns:a14="http://schemas.microsoft.com/office/drawing/2010/main" w="9525">
                 <a:solidFill>
                   <a:srgbClr val="000000"/>
                 </a:solidFill>
@@ -4377,7 +4377,7 @@
           <a:p>
             <a:fld id="{846CE7D5-CF57-46EF-B807-FDD0502418D4}" type="datetimeFigureOut">
               <a:rPr lang="en-US" smtClean="0"/>
-              <a:t>2/21/2021</a:t>
+              <a:t>2/22/2021</a:t>
             </a:fld>
             <a:endParaRPr lang="en-US"/>
           </a:p>
@@ -4533,7 +4533,7 @@
           <a:ln/>
           <a:extLst>
             <a:ext uri="{91240B29-F687-4f45-9708-019B960494DF}">
-              <a14:hiddenLine xmlns:a14="http://schemas.microsoft.com/office/drawing/2010/main" xmlns="" w="9525">
+              <a14:hiddenLine xmlns="" xmlns:a14="http://schemas.microsoft.com/office/drawing/2010/main" w="9525">
                 <a:solidFill>
                   <a:srgbClr val="000000"/>
                 </a:solidFill>
@@ -4661,7 +4661,7 @@
           <a:p>
             <a:fld id="{846CE7D5-CF57-46EF-B807-FDD0502418D4}" type="datetimeFigureOut">
               <a:rPr lang="en-US" smtClean="0"/>
-              <a:t>2/21/2021</a:t>
+              <a:t>2/22/2021</a:t>
             </a:fld>
             <a:endParaRPr lang="en-US"/>
           </a:p>
@@ -5005,7 +5005,7 @@
           <a:p>
             <a:fld id="{846CE7D5-CF57-46EF-B807-FDD0502418D4}" type="datetimeFigureOut">
               <a:rPr lang="en-US" smtClean="0"/>
-              <a:t>2/21/2021</a:t>
+              <a:t>2/22/2021</a:t>
             </a:fld>
             <a:endParaRPr lang="en-US"/>
           </a:p>
@@ -5161,7 +5161,7 @@
           <a:ln/>
           <a:extLst>
             <a:ext uri="{91240B29-F687-4f45-9708-019B960494DF}">
-              <a14:hiddenLine xmlns:a14="http://schemas.microsoft.com/office/drawing/2010/main" xmlns="" w="9525">
+              <a14:hiddenLine xmlns="" xmlns:a14="http://schemas.microsoft.com/office/drawing/2010/main" w="9525">
                 <a:solidFill>
                   <a:srgbClr val="000000"/>
                 </a:solidFill>
@@ -5345,7 +5345,7 @@
           <a:p>
             <a:fld id="{846CE7D5-CF57-46EF-B807-FDD0502418D4}" type="datetimeFigureOut">
               <a:rPr lang="en-US" smtClean="0"/>
-              <a:t>2/21/2021</a:t>
+              <a:t>2/22/2021</a:t>
             </a:fld>
             <a:endParaRPr lang="en-US"/>
           </a:p>
@@ -5501,7 +5501,7 @@
           <a:ln/>
           <a:extLst>
             <a:ext uri="{91240B29-F687-4f45-9708-019B960494DF}">
-              <a14:hiddenLine xmlns:a14="http://schemas.microsoft.com/office/drawing/2010/main" xmlns="" w="9525">
+              <a14:hiddenLine xmlns="" xmlns:a14="http://schemas.microsoft.com/office/drawing/2010/main" w="9525">
                 <a:solidFill>
                   <a:srgbClr val="000000"/>
                 </a:solidFill>
@@ -5823,7 +5823,7 @@
           <a:p>
             <a:fld id="{846CE7D5-CF57-46EF-B807-FDD0502418D4}" type="datetimeFigureOut">
               <a:rPr lang="en-US" smtClean="0"/>
-              <a:t>2/21/2021</a:t>
+              <a:t>2/22/2021</a:t>
             </a:fld>
             <a:endParaRPr lang="en-US"/>
           </a:p>
@@ -5979,7 +5979,7 @@
           <a:ln/>
           <a:extLst>
             <a:ext uri="{91240B29-F687-4f45-9708-019B960494DF}">
-              <a14:hiddenLine xmlns:a14="http://schemas.microsoft.com/office/drawing/2010/main" xmlns="" w="9525">
+              <a14:hiddenLine xmlns="" xmlns:a14="http://schemas.microsoft.com/office/drawing/2010/main" w="9525">
                 <a:solidFill>
                   <a:srgbClr val="000000"/>
                 </a:solidFill>
@@ -6045,7 +6045,7 @@
           <a:p>
             <a:fld id="{846CE7D5-CF57-46EF-B807-FDD0502418D4}" type="datetimeFigureOut">
               <a:rPr lang="en-US" smtClean="0"/>
-              <a:t>2/21/2021</a:t>
+              <a:t>2/22/2021</a:t>
             </a:fld>
             <a:endParaRPr lang="en-US"/>
           </a:p>
@@ -6141,7 +6141,7 @@
           <a:p>
             <a:fld id="{846CE7D5-CF57-46EF-B807-FDD0502418D4}" type="datetimeFigureOut">
               <a:rPr lang="en-US" smtClean="0"/>
-              <a:t>2/21/2021</a:t>
+              <a:t>2/22/2021</a:t>
             </a:fld>
             <a:endParaRPr lang="en-US"/>
           </a:p>
@@ -6410,7 +6410,7 @@
           <a:ln/>
           <a:extLst>
             <a:ext uri="{91240B29-F687-4f45-9708-019B960494DF}">
-              <a14:hiddenLine xmlns:a14="http://schemas.microsoft.com/office/drawing/2010/main" xmlns="" w="9525">
+              <a14:hiddenLine xmlns="" xmlns:a14="http://schemas.microsoft.com/office/drawing/2010/main" w="9525">
                 <a:solidFill>
                   <a:srgbClr val="000000"/>
                 </a:solidFill>
@@ -6609,7 +6609,7 @@
           <a:p>
             <a:fld id="{846CE7D5-CF57-46EF-B807-FDD0502418D4}" type="datetimeFigureOut">
               <a:rPr lang="en-US" smtClean="0"/>
-              <a:t>2/21/2021</a:t>
+              <a:t>2/22/2021</a:t>
             </a:fld>
             <a:endParaRPr lang="en-US"/>
           </a:p>
@@ -6923,7 +6923,7 @@
           <a:p>
             <a:fld id="{846CE7D5-CF57-46EF-B807-FDD0502418D4}" type="datetimeFigureOut">
               <a:rPr lang="en-US" smtClean="0"/>
-              <a:t>2/21/2021</a:t>
+              <a:t>2/22/2021</a:t>
             </a:fld>
             <a:endParaRPr lang="en-US"/>
           </a:p>
@@ -7194,7 +7194,7 @@
           <a:p>
             <a:fld id="{846CE7D5-CF57-46EF-B807-FDD0502418D4}" type="datetimeFigureOut">
               <a:rPr lang="en-US" smtClean="0"/>
-              <a:t>2/21/2021</a:t>
+              <a:t>2/22/2021</a:t>
             </a:fld>
             <a:endParaRPr lang="en-US"/>
           </a:p>
@@ -9441,7 +9441,7 @@
           <a:effectLst/>
           <a:extLst>
             <a:ext uri="{91240B29-F687-4f45-9708-019B960494DF}">
-              <a14:hiddenLine xmlns="" xmlns:a16="http://schemas.microsoft.com/office/drawing/2014/main" xmlns:p14="http://schemas.microsoft.com/office/powerpoint/2010/main" xmlns:a14="http://schemas.microsoft.com/office/drawing/2010/main" w="9525">
+              <a14:hiddenLine xmlns:a14="http://schemas.microsoft.com/office/drawing/2010/main" xmlns:p14="http://schemas.microsoft.com/office/powerpoint/2010/main" xmlns:a16="http://schemas.microsoft.com/office/drawing/2014/main" xmlns="" w="9525">
                 <a:solidFill>
                   <a:srgbClr val="000000"/>
                 </a:solidFill>
@@ -9748,154 +9748,6 @@
           <p:cNvPr id="2" name="Title 1">
             <a:extLst>
               <a:ext uri="{FF2B5EF4-FFF2-40B4-BE49-F238E27FC236}">
-                <a16:creationId xmlns:a16="http://schemas.microsoft.com/office/drawing/2014/main" id="{568F6066-6AE7-4761-B163-B3AF571BC284}"/>
-              </a:ext>
-            </a:extLst>
-          </p:cNvPr>
-          <p:cNvSpPr>
-            <a:spLocks noGrp="1"/>
-          </p:cNvSpPr>
-          <p:nvPr>
-            <p:ph type="title"/>
-          </p:nvPr>
-        </p:nvSpPr>
-        <p:spPr/>
-        <p:txBody>
-          <a:bodyPr/>
-          <a:lstStyle/>
-          <a:p>
-            <a:r>
-              <a:rPr lang="pt-PT">
-                <a:cs typeface="Calibri Light"/>
-              </a:rPr>
-              <a:t>Modelo de dados</a:t>
-            </a:r>
-          </a:p>
-        </p:txBody>
-      </p:sp>
-      <p:pic>
-        <p:nvPicPr>
-          <p:cNvPr id="4" name="Picture 4" descr="Timeline&#10;&#10;Description automatically generated">
-            <a:extLst>
-              <a:ext uri="{FF2B5EF4-FFF2-40B4-BE49-F238E27FC236}">
-                <a16:creationId xmlns:a16="http://schemas.microsoft.com/office/drawing/2014/main" id="{B0337396-70A9-42E5-90D7-4B86377AB3B8}"/>
-              </a:ext>
-            </a:extLst>
-          </p:cNvPr>
-          <p:cNvPicPr>
-            <a:picLocks noGrp="1" noChangeAspect="1"/>
-          </p:cNvPicPr>
-          <p:nvPr>
-            <p:ph idx="1"/>
-          </p:nvPr>
-        </p:nvPicPr>
-        <p:blipFill>
-          <a:blip r:embed="rId3"/>
-          <a:stretch>
-            <a:fillRect/>
-          </a:stretch>
-        </p:blipFill>
-        <p:spPr>
-          <a:xfrm>
-            <a:off x="809999" y="1865450"/>
-            <a:ext cx="8953433" cy="4778462"/>
-          </a:xfrm>
-        </p:spPr>
-      </p:pic>
-      <p:sp>
-        <p:nvSpPr>
-          <p:cNvPr id="5" name="Slide Number Placeholder 4">
-            <a:extLst>
-              <a:ext uri="{FF2B5EF4-FFF2-40B4-BE49-F238E27FC236}">
-                <a16:creationId xmlns:a16="http://schemas.microsoft.com/office/drawing/2014/main" id="{A8D1AE86-7ECD-4803-BBE8-BB51CCAD47AF}"/>
-              </a:ext>
-            </a:extLst>
-          </p:cNvPr>
-          <p:cNvSpPr>
-            <a:spLocks noGrp="1"/>
-          </p:cNvSpPr>
-          <p:nvPr>
-            <p:ph type="sldNum" sz="quarter" idx="12"/>
-          </p:nvPr>
-        </p:nvSpPr>
-        <p:spPr/>
-        <p:txBody>
-          <a:bodyPr/>
-          <a:lstStyle/>
-          <a:p>
-            <a:fld id="{330EA680-D336-4FF7-8B7A-9848BB0A1C32}" type="slidenum">
-              <a:rPr lang="en-US" smtClean="0"/>
-              <a:t>6</a:t>
-            </a:fld>
-            <a:endParaRPr lang="en-US"/>
-          </a:p>
-        </p:txBody>
-      </p:sp>
-      <p:pic>
-        <p:nvPicPr>
-          <p:cNvPr id="3" name="Picture 5" descr="A picture containing shape&#10;&#10;Description automatically generated">
-            <a:extLst>
-              <a:ext uri="{FF2B5EF4-FFF2-40B4-BE49-F238E27FC236}">
-                <a16:creationId xmlns:a16="http://schemas.microsoft.com/office/drawing/2014/main" id="{C5831AD5-1D24-4D0F-B8FB-FDBA125E2A0B}"/>
-              </a:ext>
-            </a:extLst>
-          </p:cNvPr>
-          <p:cNvPicPr>
-            <a:picLocks noChangeAspect="1"/>
-          </p:cNvPicPr>
-          <p:nvPr/>
-        </p:nvPicPr>
-        <p:blipFill>
-          <a:blip r:embed="rId4"/>
-          <a:stretch>
-            <a:fillRect/>
-          </a:stretch>
-        </p:blipFill>
-        <p:spPr>
-          <a:xfrm>
-            <a:off x="9069860" y="350287"/>
-            <a:ext cx="2743200" cy="555696"/>
-          </a:xfrm>
-          <a:prstGeom prst="rect">
-            <a:avLst/>
-          </a:prstGeom>
-        </p:spPr>
-      </p:pic>
-    </p:spTree>
-    <p:extLst>
-      <p:ext uri="{BB962C8B-B14F-4D97-AF65-F5344CB8AC3E}">
-        <p14:creationId xmlns:p14="http://schemas.microsoft.com/office/powerpoint/2010/main" val="431134621"/>
-      </p:ext>
-    </p:extLst>
-  </p:cSld>
-  <p:clrMapOvr>
-    <a:masterClrMapping/>
-  </p:clrMapOvr>
-</p:sld>
-</file>
-
-<file path=ppt/slides/slide7.xml><?xml version="1.0" encoding="utf-8"?>
-<p:sld xmlns:a="http://schemas.openxmlformats.org/drawingml/2006/main" xmlns:r="http://schemas.openxmlformats.org/officeDocument/2006/relationships" xmlns:p="http://schemas.openxmlformats.org/presentationml/2006/main">
-  <p:cSld>
-    <p:spTree>
-      <p:nvGrpSpPr>
-        <p:cNvPr id="1" name=""/>
-        <p:cNvGrpSpPr/>
-        <p:nvPr/>
-      </p:nvGrpSpPr>
-      <p:grpSpPr>
-        <a:xfrm>
-          <a:off x="0" y="0"/>
-          <a:ext cx="0" cy="0"/>
-          <a:chOff x="0" y="0"/>
-          <a:chExt cx="0" cy="0"/>
-        </a:xfrm>
-      </p:grpSpPr>
-      <p:sp>
-        <p:nvSpPr>
-          <p:cNvPr id="2" name="Title 1">
-            <a:extLst>
-              <a:ext uri="{FF2B5EF4-FFF2-40B4-BE49-F238E27FC236}">
                 <a16:creationId xmlns:a16="http://schemas.microsoft.com/office/drawing/2014/main" id="{0153169A-9320-4D74-B65D-516B3318AC94}"/>
               </a:ext>
             </a:extLst>
@@ -10095,7 +9947,7 @@
           <a:p>
             <a:fld id="{330EA680-D336-4FF7-8B7A-9848BB0A1C32}" type="slidenum">
               <a:rPr lang="en-US" smtClean="0"/>
-              <a:t>7</a:t>
+              <a:t>6</a:t>
             </a:fld>
             <a:endParaRPr lang="en-US"/>
           </a:p>
@@ -10174,7 +10026,7 @@
 </p:sld>
 </file>
 
-<file path=ppt/slides/slide8.xml><?xml version="1.0" encoding="utf-8"?>
+<file path=ppt/slides/slide7.xml><?xml version="1.0" encoding="utf-8"?>
 <p:sld xmlns:a="http://schemas.openxmlformats.org/drawingml/2006/main" xmlns:r="http://schemas.openxmlformats.org/officeDocument/2006/relationships" xmlns:p="http://schemas.openxmlformats.org/presentationml/2006/main">
   <p:cSld>
     <p:spTree>
@@ -10361,7 +10213,7 @@
           <a:p>
             <a:fld id="{330EA680-D336-4FF7-8B7A-9848BB0A1C32}" type="slidenum">
               <a:rPr lang="en-US" smtClean="0"/>
-              <a:t>8</a:t>
+              <a:t>7</a:t>
             </a:fld>
             <a:endParaRPr lang="en-US"/>
           </a:p>
@@ -10431,6 +10283,154 @@
     <p:extLst>
       <p:ext uri="{BB962C8B-B14F-4D97-AF65-F5344CB8AC3E}">
         <p14:creationId xmlns:p14="http://schemas.microsoft.com/office/powerpoint/2010/main" val="3927402489"/>
+      </p:ext>
+    </p:extLst>
+  </p:cSld>
+  <p:clrMapOvr>
+    <a:masterClrMapping/>
+  </p:clrMapOvr>
+</p:sld>
+</file>
+
+<file path=ppt/slides/slide8.xml><?xml version="1.0" encoding="utf-8"?>
+<p:sld xmlns:a="http://schemas.openxmlformats.org/drawingml/2006/main" xmlns:r="http://schemas.openxmlformats.org/officeDocument/2006/relationships" xmlns:p="http://schemas.openxmlformats.org/presentationml/2006/main">
+  <p:cSld>
+    <p:spTree>
+      <p:nvGrpSpPr>
+        <p:cNvPr id="1" name=""/>
+        <p:cNvGrpSpPr/>
+        <p:nvPr/>
+      </p:nvGrpSpPr>
+      <p:grpSpPr>
+        <a:xfrm>
+          <a:off x="0" y="0"/>
+          <a:ext cx="0" cy="0"/>
+          <a:chOff x="0" y="0"/>
+          <a:chExt cx="0" cy="0"/>
+        </a:xfrm>
+      </p:grpSpPr>
+      <p:sp>
+        <p:nvSpPr>
+          <p:cNvPr id="2" name="Title 1">
+            <a:extLst>
+              <a:ext uri="{FF2B5EF4-FFF2-40B4-BE49-F238E27FC236}">
+                <a16:creationId xmlns:a16="http://schemas.microsoft.com/office/drawing/2014/main" id="{568F6066-6AE7-4761-B163-B3AF571BC284}"/>
+              </a:ext>
+            </a:extLst>
+          </p:cNvPr>
+          <p:cNvSpPr>
+            <a:spLocks noGrp="1"/>
+          </p:cNvSpPr>
+          <p:nvPr>
+            <p:ph type="title"/>
+          </p:nvPr>
+        </p:nvSpPr>
+        <p:spPr/>
+        <p:txBody>
+          <a:bodyPr/>
+          <a:lstStyle/>
+          <a:p>
+            <a:r>
+              <a:rPr lang="pt-PT">
+                <a:cs typeface="Calibri Light"/>
+              </a:rPr>
+              <a:t>Modelo de dados</a:t>
+            </a:r>
+          </a:p>
+        </p:txBody>
+      </p:sp>
+      <p:pic>
+        <p:nvPicPr>
+          <p:cNvPr id="4" name="Picture 4" descr="Timeline&#10;&#10;Description automatically generated">
+            <a:extLst>
+              <a:ext uri="{FF2B5EF4-FFF2-40B4-BE49-F238E27FC236}">
+                <a16:creationId xmlns:a16="http://schemas.microsoft.com/office/drawing/2014/main" id="{B0337396-70A9-42E5-90D7-4B86377AB3B8}"/>
+              </a:ext>
+            </a:extLst>
+          </p:cNvPr>
+          <p:cNvPicPr>
+            <a:picLocks noGrp="1" noChangeAspect="1"/>
+          </p:cNvPicPr>
+          <p:nvPr>
+            <p:ph idx="1"/>
+          </p:nvPr>
+        </p:nvPicPr>
+        <p:blipFill>
+          <a:blip r:embed="rId3"/>
+          <a:stretch>
+            <a:fillRect/>
+          </a:stretch>
+        </p:blipFill>
+        <p:spPr>
+          <a:xfrm>
+            <a:off x="809999" y="1865450"/>
+            <a:ext cx="8953433" cy="4778462"/>
+          </a:xfrm>
+        </p:spPr>
+      </p:pic>
+      <p:sp>
+        <p:nvSpPr>
+          <p:cNvPr id="5" name="Slide Number Placeholder 4">
+            <a:extLst>
+              <a:ext uri="{FF2B5EF4-FFF2-40B4-BE49-F238E27FC236}">
+                <a16:creationId xmlns:a16="http://schemas.microsoft.com/office/drawing/2014/main" id="{A8D1AE86-7ECD-4803-BBE8-BB51CCAD47AF}"/>
+              </a:ext>
+            </a:extLst>
+          </p:cNvPr>
+          <p:cNvSpPr>
+            <a:spLocks noGrp="1"/>
+          </p:cNvSpPr>
+          <p:nvPr>
+            <p:ph type="sldNum" sz="quarter" idx="12"/>
+          </p:nvPr>
+        </p:nvSpPr>
+        <p:spPr/>
+        <p:txBody>
+          <a:bodyPr/>
+          <a:lstStyle/>
+          <a:p>
+            <a:fld id="{330EA680-D336-4FF7-8B7A-9848BB0A1C32}" type="slidenum">
+              <a:rPr lang="en-US" smtClean="0"/>
+              <a:t>8</a:t>
+            </a:fld>
+            <a:endParaRPr lang="en-US"/>
+          </a:p>
+        </p:txBody>
+      </p:sp>
+      <p:pic>
+        <p:nvPicPr>
+          <p:cNvPr id="3" name="Picture 5" descr="A picture containing shape&#10;&#10;Description automatically generated">
+            <a:extLst>
+              <a:ext uri="{FF2B5EF4-FFF2-40B4-BE49-F238E27FC236}">
+                <a16:creationId xmlns:a16="http://schemas.microsoft.com/office/drawing/2014/main" id="{C5831AD5-1D24-4D0F-B8FB-FDBA125E2A0B}"/>
+              </a:ext>
+            </a:extLst>
+          </p:cNvPr>
+          <p:cNvPicPr>
+            <a:picLocks noChangeAspect="1"/>
+          </p:cNvPicPr>
+          <p:nvPr/>
+        </p:nvPicPr>
+        <p:blipFill>
+          <a:blip r:embed="rId4"/>
+          <a:stretch>
+            <a:fillRect/>
+          </a:stretch>
+        </p:blipFill>
+        <p:spPr>
+          <a:xfrm>
+            <a:off x="9069860" y="350287"/>
+            <a:ext cx="2743200" cy="555696"/>
+          </a:xfrm>
+          <a:prstGeom prst="rect">
+            <a:avLst/>
+          </a:prstGeom>
+        </p:spPr>
+      </p:pic>
+    </p:spTree>
+    <p:extLst>
+      <p:ext uri="{BB962C8B-B14F-4D97-AF65-F5344CB8AC3E}">
+        <p14:creationId xmlns:p14="http://schemas.microsoft.com/office/powerpoint/2010/main" val="431134621"/>
       </p:ext>
     </p:extLst>
   </p:cSld>

</xml_diff>